<commit_message>
agrego der de tablas log y agrego en entrega los trigger
</commit_message>
<xml_diff>
--- a/Entrega2_Rodriguez.pptx
+++ b/Entrega2_Rodriguez.pptx
@@ -19,6 +19,7 @@
     <p:sldId id="267" r:id="rId13"/>
     <p:sldId id="268" r:id="rId14"/>
     <p:sldId id="269" r:id="rId15"/>
+    <p:sldId id="270" r:id="rId16"/>
   </p:sldIdLst>
   <p:sldSz cx="12192000" cy="6858000"/>
   <p:notesSz cx="6858000" cy="9144000"/>
@@ -131,6 +132,7 @@
     <p1510:client id="{D7F6D08A-1FEC-4FB3-9581-6C4FBA8B4829}" v="99" dt="2023-08-14T01:48:54.909"/>
     <p1510:client id="{E2F62E71-F0E0-4681-9DBA-B4F0C5619098}" v="1145" dt="2023-08-15T03:02:32.936"/>
     <p1510:client id="{E9313721-CA13-4DAD-81C5-224DEDE82A86}" v="1252" dt="2023-08-14T01:01:16.455"/>
+    <p1510:client id="{EF0076CA-C1F8-4230-B3F7-B84B66B76894}" v="108" dt="2023-08-15T03:12:42.326"/>
   </p1510:revLst>
 </p1510:revInfo>
 </file>
@@ -7350,6 +7352,18 @@
           </a:bodyPr>
           <a:lstStyle/>
           <a:p>
+            <a:endParaRPr lang="en-US" b="1" dirty="0">
+              <a:ea typeface="+mn-lt"/>
+              <a:cs typeface="+mn-lt"/>
+            </a:endParaRPr>
+          </a:p>
+          <a:p>
+            <a:endParaRPr lang="en-US" b="1" dirty="0">
+              <a:ea typeface="+mn-lt"/>
+              <a:cs typeface="+mn-lt"/>
+            </a:endParaRPr>
+          </a:p>
+          <a:p>
             <a:r>
               <a:rPr lang="en-US" b="1" dirty="0" err="1">
                 <a:ea typeface="+mn-lt"/>
@@ -7706,6 +7720,277 @@
     <p:extLst>
       <p:ext uri="{BB962C8B-B14F-4D97-AF65-F5344CB8AC3E}">
         <p14:creationId xmlns:p14="http://schemas.microsoft.com/office/powerpoint/2010/main" val="725071626"/>
+      </p:ext>
+    </p:extLst>
+  </p:cSld>
+  <p:clrMapOvr>
+    <a:masterClrMapping/>
+  </p:clrMapOvr>
+</p:sld>
+</file>
+
+<file path=ppt/slides/slide15.xml><?xml version="1.0" encoding="utf-8"?>
+<p:sld xmlns:a="http://schemas.openxmlformats.org/drawingml/2006/main" xmlns:r="http://schemas.openxmlformats.org/officeDocument/2006/relationships" xmlns:p="http://schemas.openxmlformats.org/presentationml/2006/main">
+  <p:cSld>
+    <p:spTree>
+      <p:nvGrpSpPr>
+        <p:cNvPr id="1" name=""/>
+        <p:cNvGrpSpPr/>
+        <p:nvPr/>
+      </p:nvGrpSpPr>
+      <p:grpSpPr>
+        <a:xfrm>
+          <a:off x="0" y="0"/>
+          <a:ext cx="0" cy="0"/>
+          <a:chOff x="0" y="0"/>
+          <a:chExt cx="0" cy="0"/>
+        </a:xfrm>
+      </p:grpSpPr>
+      <p:sp>
+        <p:nvSpPr>
+          <p:cNvPr id="2" name="Title 1">
+            <a:extLst>
+              <a:ext uri="{FF2B5EF4-FFF2-40B4-BE49-F238E27FC236}">
+                <a16:creationId xmlns:a16="http://schemas.microsoft.com/office/drawing/2014/main" id="{9956E7C7-1079-A67C-CA2E-8051D79D911E}"/>
+              </a:ext>
+            </a:extLst>
+          </p:cNvPr>
+          <p:cNvSpPr>
+            <a:spLocks noGrp="1"/>
+          </p:cNvSpPr>
+          <p:nvPr>
+            <p:ph type="title"/>
+          </p:nvPr>
+        </p:nvSpPr>
+        <p:spPr/>
+        <p:txBody>
+          <a:bodyPr>
+            <a:normAutofit/>
+          </a:bodyPr>
+          <a:lstStyle/>
+          <a:p>
+            <a:r>
+              <a:rPr lang="en-US" sz="2200" dirty="0"/>
+              <a:t>Trigger:</a:t>
+            </a:r>
+          </a:p>
+        </p:txBody>
+      </p:sp>
+      <p:sp>
+        <p:nvSpPr>
+          <p:cNvPr id="3" name="Content Placeholder 2">
+            <a:extLst>
+              <a:ext uri="{FF2B5EF4-FFF2-40B4-BE49-F238E27FC236}">
+                <a16:creationId xmlns:a16="http://schemas.microsoft.com/office/drawing/2014/main" id="{D5231D44-776B-EE30-754B-22657D31FACE}"/>
+              </a:ext>
+            </a:extLst>
+          </p:cNvPr>
+          <p:cNvSpPr>
+            <a:spLocks noGrp="1"/>
+          </p:cNvSpPr>
+          <p:nvPr>
+            <p:ph idx="1"/>
+          </p:nvPr>
+        </p:nvSpPr>
+        <p:spPr/>
+        <p:txBody>
+          <a:bodyPr vert="horz" lIns="91440" tIns="45720" rIns="91440" bIns="45720" rtlCol="0" anchor="t">
+            <a:normAutofit/>
+          </a:bodyPr>
+          <a:lstStyle/>
+          <a:p>
+            <a:r>
+              <a:rPr lang="en-US" b="1" err="1">
+                <a:ea typeface="+mn-lt"/>
+                <a:cs typeface="+mn-lt"/>
+              </a:rPr>
+              <a:t>tr_update_ticket</a:t>
+            </a:r>
+            <a:r>
+              <a:rPr lang="en-US" b="1" dirty="0">
+                <a:ea typeface="+mn-lt"/>
+                <a:cs typeface="+mn-lt"/>
+              </a:rPr>
+              <a:t>:</a:t>
+            </a:r>
+            <a:r>
+              <a:rPr lang="en-US" dirty="0">
+                <a:ea typeface="+mn-lt"/>
+                <a:cs typeface="+mn-lt"/>
+              </a:rPr>
+              <a:t> se </a:t>
+            </a:r>
+            <a:r>
+              <a:rPr lang="en-US" err="1">
+                <a:ea typeface="+mn-lt"/>
+                <a:cs typeface="+mn-lt"/>
+              </a:rPr>
+              <a:t>activa</a:t>
+            </a:r>
+            <a:r>
+              <a:rPr lang="en-US" dirty="0">
+                <a:ea typeface="+mn-lt"/>
+                <a:cs typeface="+mn-lt"/>
+              </a:rPr>
+              <a:t> luego de </a:t>
+            </a:r>
+            <a:r>
+              <a:rPr lang="en-US" err="1">
+                <a:ea typeface="+mn-lt"/>
+                <a:cs typeface="+mn-lt"/>
+              </a:rPr>
+              <a:t>cambiarse</a:t>
+            </a:r>
+            <a:r>
+              <a:rPr lang="en-US" dirty="0">
+                <a:ea typeface="+mn-lt"/>
+                <a:cs typeface="+mn-lt"/>
+              </a:rPr>
+              <a:t> </a:t>
+            </a:r>
+            <a:r>
+              <a:rPr lang="en-US" err="1">
+                <a:ea typeface="+mn-lt"/>
+                <a:cs typeface="+mn-lt"/>
+              </a:rPr>
+              <a:t>alguna</a:t>
+            </a:r>
+            <a:r>
+              <a:rPr lang="en-US" dirty="0">
+                <a:ea typeface="+mn-lt"/>
+                <a:cs typeface="+mn-lt"/>
+              </a:rPr>
+              <a:t> </a:t>
+            </a:r>
+            <a:r>
+              <a:rPr lang="en-US" err="1">
+                <a:ea typeface="+mn-lt"/>
+                <a:cs typeface="+mn-lt"/>
+              </a:rPr>
+              <a:t>columna</a:t>
+            </a:r>
+            <a:r>
+              <a:rPr lang="en-US" dirty="0">
+                <a:ea typeface="+mn-lt"/>
+                <a:cs typeface="+mn-lt"/>
+              </a:rPr>
+              <a:t> </a:t>
+            </a:r>
+            <a:r>
+              <a:rPr lang="en-US" err="1">
+                <a:ea typeface="+mn-lt"/>
+                <a:cs typeface="+mn-lt"/>
+              </a:rPr>
+              <a:t>en</a:t>
+            </a:r>
+            <a:r>
+              <a:rPr lang="en-US" dirty="0">
+                <a:ea typeface="+mn-lt"/>
+                <a:cs typeface="+mn-lt"/>
+              </a:rPr>
+              <a:t> </a:t>
+            </a:r>
+            <a:r>
+              <a:rPr lang="en-US" err="1">
+                <a:ea typeface="+mn-lt"/>
+                <a:cs typeface="+mn-lt"/>
+              </a:rPr>
+              <a:t>algun</a:t>
+            </a:r>
+            <a:r>
+              <a:rPr lang="en-US" dirty="0">
+                <a:ea typeface="+mn-lt"/>
+                <a:cs typeface="+mn-lt"/>
+              </a:rPr>
+              <a:t> ticket</a:t>
+            </a:r>
+          </a:p>
+          <a:p>
+            <a:r>
+              <a:rPr lang="en-US" b="1" err="1">
+                <a:ea typeface="+mn-lt"/>
+                <a:cs typeface="+mn-lt"/>
+              </a:rPr>
+              <a:t>tr_create_empresa</a:t>
+            </a:r>
+            <a:r>
+              <a:rPr lang="en-US" b="1" dirty="0">
+                <a:ea typeface="+mn-lt"/>
+                <a:cs typeface="+mn-lt"/>
+              </a:rPr>
+              <a:t>:</a:t>
+            </a:r>
+            <a:r>
+              <a:rPr lang="en-US" dirty="0">
+                <a:ea typeface="+mn-lt"/>
+                <a:cs typeface="+mn-lt"/>
+              </a:rPr>
+              <a:t> se </a:t>
+            </a:r>
+            <a:r>
+              <a:rPr lang="en-US" err="1">
+                <a:ea typeface="+mn-lt"/>
+                <a:cs typeface="+mn-lt"/>
+              </a:rPr>
+              <a:t>dispara</a:t>
+            </a:r>
+            <a:r>
+              <a:rPr lang="en-US" dirty="0">
+                <a:ea typeface="+mn-lt"/>
+                <a:cs typeface="+mn-lt"/>
+              </a:rPr>
+              <a:t> luego de </a:t>
+            </a:r>
+            <a:r>
+              <a:rPr lang="en-US" err="1">
+                <a:ea typeface="+mn-lt"/>
+                <a:cs typeface="+mn-lt"/>
+              </a:rPr>
+              <a:t>crearse</a:t>
+            </a:r>
+            <a:r>
+              <a:rPr lang="en-US" dirty="0">
+                <a:ea typeface="+mn-lt"/>
+                <a:cs typeface="+mn-lt"/>
+              </a:rPr>
+              <a:t> </a:t>
+            </a:r>
+            <a:r>
+              <a:rPr lang="en-US" err="1">
+                <a:ea typeface="+mn-lt"/>
+                <a:cs typeface="+mn-lt"/>
+              </a:rPr>
+              <a:t>una</a:t>
+            </a:r>
+            <a:r>
+              <a:rPr lang="en-US" dirty="0">
+                <a:ea typeface="+mn-lt"/>
+                <a:cs typeface="+mn-lt"/>
+              </a:rPr>
+              <a:t> </a:t>
+            </a:r>
+            <a:r>
+              <a:rPr lang="en-US" err="1">
+                <a:ea typeface="+mn-lt"/>
+                <a:cs typeface="+mn-lt"/>
+              </a:rPr>
+              <a:t>empresa</a:t>
+            </a:r>
+            <a:r>
+              <a:rPr lang="en-US" dirty="0">
+                <a:ea typeface="+mn-lt"/>
+                <a:cs typeface="+mn-lt"/>
+              </a:rPr>
+              <a:t>.</a:t>
+            </a:r>
+            <a:endParaRPr lang="en-US" dirty="0"/>
+          </a:p>
+        </p:txBody>
+      </p:sp>
+    </p:spTree>
+    <p:extLst>
+      <p:ext uri="{BB962C8B-B14F-4D97-AF65-F5344CB8AC3E}">
+        <p14:creationId xmlns:p14="http://schemas.microsoft.com/office/powerpoint/2010/main" val="3157992418"/>
       </p:ext>
     </p:extLst>
   </p:cSld>

</xml_diff>